<commit_message>
Duombazes uzduotis 2, papildyta
</commit_message>
<xml_diff>
--- a/Skaidres/13_paskaita (Duomenų bazės 2).pptx
+++ b/Skaidres/13_paskaita (Duomenų bazės 2).pptx
@@ -9210,9 +9210,9 @@
         <p:grpSpPr>
           <a:xfrm>
             <a:off x="11078640" y="458640"/>
-            <a:ext cx="631800" cy="679680"/>
+            <a:ext cx="631440" cy="679320"/>
             <a:chOff x="11078640" y="458640"/>
-            <a:chExt cx="631800" cy="679680"/>
+            <a:chExt cx="631440" cy="679320"/>
           </a:xfrm>
         </p:grpSpPr>
         <p:sp>
@@ -9224,7 +9224,7 @@
           <p:spPr>
             <a:xfrm>
               <a:off x="11078640" y="458640"/>
-              <a:ext cx="631800" cy="679680"/>
+              <a:ext cx="631440" cy="679320"/>
             </a:xfrm>
             <a:custGeom>
               <a:avLst/>
@@ -9345,7 +9345,7 @@
           <p:spPr>
             <a:xfrm>
               <a:off x="11477160" y="873000"/>
-              <a:ext cx="53280" cy="52920"/>
+              <a:ext cx="52920" cy="52560"/>
             </a:xfrm>
             <a:custGeom>
               <a:avLst/>
@@ -9401,7 +9401,7 @@
           <p:spPr>
             <a:xfrm>
               <a:off x="11259360" y="873000"/>
-              <a:ext cx="53280" cy="52920"/>
+              <a:ext cx="52920" cy="52560"/>
             </a:xfrm>
             <a:custGeom>
               <a:avLst/>
@@ -9457,7 +9457,7 @@
           <p:spPr>
             <a:xfrm>
               <a:off x="11175120" y="546480"/>
-              <a:ext cx="439200" cy="434160"/>
+              <a:ext cx="438840" cy="433800"/>
             </a:xfrm>
             <a:custGeom>
               <a:avLst/>
@@ -9797,7 +9797,7 @@
         <p:spPr>
           <a:xfrm>
             <a:off x="475200" y="458640"/>
-            <a:ext cx="2333160" cy="681840"/>
+            <a:ext cx="2332800" cy="681480"/>
           </a:xfrm>
           <a:prstGeom prst="rect">
             <a:avLst/>
@@ -9819,8 +9819,8 @@
         </p:nvSpPr>
         <p:spPr>
           <a:xfrm>
-            <a:off x="480240" y="4373640"/>
-            <a:ext cx="2342520" cy="2681280"/>
+            <a:off x="609480" y="273600"/>
+            <a:ext cx="10972440" cy="1144800"/>
           </a:xfrm>
           <a:prstGeom prst="rect">
             <a:avLst/>
@@ -9835,13 +9835,16 @@
             <a:noAutofit/>
           </a:bodyPr>
           <a:p>
+            <a:pPr algn="ctr">
+              <a:buNone/>
+            </a:pPr>
             <a:r>
-              <a:rPr b="0" lang="lt-LT" sz="1800" spc="-1" strike="noStrike">
+              <a:rPr b="0" lang="lt-LT" sz="4400" spc="-1" strike="noStrike">
                 <a:latin typeface="Arial"/>
               </a:rPr>
               <a:t>Click to edit the title text format</a:t>
             </a:r>
-            <a:endParaRPr b="0" lang="lt-LT" sz="1800" spc="-1" strike="noStrike">
+            <a:endParaRPr b="0" lang="lt-LT" sz="4400" spc="-1" strike="noStrike">
               <a:latin typeface="Arial"/>
             </a:endParaRPr>
           </a:p>
@@ -9859,8 +9862,8 @@
         </p:nvSpPr>
         <p:spPr>
           <a:xfrm>
-            <a:off x="480240" y="460800"/>
-            <a:ext cx="5614560" cy="452520"/>
+            <a:off x="609480" y="1604520"/>
+            <a:ext cx="10972440" cy="3977280"/>
           </a:xfrm>
           <a:prstGeom prst="rect">
             <a:avLst/>
@@ -9872,7 +9875,7 @@
         </p:spPr>
         <p:txBody>
           <a:bodyPr lIns="0" rIns="0" tIns="0" bIns="0" anchor="t">
-            <a:normAutofit fontScale="19000"/>
+            <a:normAutofit/>
           </a:bodyPr>
           <a:p>
             <a:pPr marL="432000" indent="-324000">
@@ -9887,12 +9890,12 @@
               <a:buChar char=""/>
             </a:pPr>
             <a:r>
-              <a:rPr b="0" lang="lt-LT" sz="1800" spc="-1" strike="noStrike">
+              <a:rPr b="0" lang="lt-LT" sz="3200" spc="-1" strike="noStrike">
                 <a:latin typeface="Arial"/>
               </a:rPr>
               <a:t>Click to edit the outline text format</a:t>
             </a:r>
-            <a:endParaRPr b="0" lang="lt-LT" sz="1800" spc="-1" strike="noStrike">
+            <a:endParaRPr b="0" lang="lt-LT" sz="3200" spc="-1" strike="noStrike">
               <a:latin typeface="Arial"/>
             </a:endParaRPr>
           </a:p>
@@ -9909,12 +9912,12 @@
               <a:buChar char=""/>
             </a:pPr>
             <a:r>
-              <a:rPr b="0" lang="lt-LT" sz="1800" spc="-1" strike="noStrike">
+              <a:rPr b="0" lang="lt-LT" sz="2800" spc="-1" strike="noStrike">
                 <a:latin typeface="Arial"/>
               </a:rPr>
               <a:t>Second Outline Level</a:t>
             </a:r>
-            <a:endParaRPr b="0" lang="lt-LT" sz="1800" spc="-1" strike="noStrike">
+            <a:endParaRPr b="0" lang="lt-LT" sz="2800" spc="-1" strike="noStrike">
               <a:latin typeface="Arial"/>
             </a:endParaRPr>
           </a:p>
@@ -9931,12 +9934,12 @@
               <a:buChar char=""/>
             </a:pPr>
             <a:r>
-              <a:rPr b="0" lang="lt-LT" sz="1800" spc="-1" strike="noStrike">
+              <a:rPr b="0" lang="lt-LT" sz="2400" spc="-1" strike="noStrike">
                 <a:latin typeface="Arial"/>
               </a:rPr>
               <a:t>Third Outline Level</a:t>
             </a:r>
-            <a:endParaRPr b="0" lang="lt-LT" sz="1800" spc="-1" strike="noStrike">
+            <a:endParaRPr b="0" lang="lt-LT" sz="2400" spc="-1" strike="noStrike">
               <a:latin typeface="Arial"/>
             </a:endParaRPr>
           </a:p>
@@ -9953,12 +9956,12 @@
               <a:buChar char=""/>
             </a:pPr>
             <a:r>
-              <a:rPr b="0" lang="lt-LT" sz="1800" spc="-1" strike="noStrike">
+              <a:rPr b="0" lang="lt-LT" sz="2000" spc="-1" strike="noStrike">
                 <a:latin typeface="Arial"/>
               </a:rPr>
               <a:t>Fourth Outline Level</a:t>
             </a:r>
-            <a:endParaRPr b="0" lang="lt-LT" sz="1800" spc="-1" strike="noStrike">
+            <a:endParaRPr b="0" lang="lt-LT" sz="2000" spc="-1" strike="noStrike">
               <a:latin typeface="Arial"/>
             </a:endParaRPr>
           </a:p>
@@ -9975,12 +9978,12 @@
               <a:buChar char=""/>
             </a:pPr>
             <a:r>
-              <a:rPr b="0" lang="lt-LT" sz="1800" spc="-1" strike="noStrike">
+              <a:rPr b="0" lang="lt-LT" sz="2000" spc="-1" strike="noStrike">
                 <a:latin typeface="Arial"/>
               </a:rPr>
               <a:t>Fifth Outline Level</a:t>
             </a:r>
-            <a:endParaRPr b="0" lang="lt-LT" sz="1800" spc="-1" strike="noStrike">
+            <a:endParaRPr b="0" lang="lt-LT" sz="2000" spc="-1" strike="noStrike">
               <a:latin typeface="Arial"/>
             </a:endParaRPr>
           </a:p>
@@ -9997,12 +10000,12 @@
               <a:buChar char=""/>
             </a:pPr>
             <a:r>
-              <a:rPr b="0" lang="lt-LT" sz="1800" spc="-1" strike="noStrike">
+              <a:rPr b="0" lang="lt-LT" sz="2000" spc="-1" strike="noStrike">
                 <a:latin typeface="Arial"/>
               </a:rPr>
               <a:t>Sixth Outline Level</a:t>
             </a:r>
-            <a:endParaRPr b="0" lang="lt-LT" sz="1800" spc="-1" strike="noStrike">
+            <a:endParaRPr b="0" lang="lt-LT" sz="2000" spc="-1" strike="noStrike">
               <a:latin typeface="Arial"/>
             </a:endParaRPr>
           </a:p>
@@ -10019,12 +10022,12 @@
               <a:buChar char=""/>
             </a:pPr>
             <a:r>
-              <a:rPr b="0" lang="lt-LT" sz="1800" spc="-1" strike="noStrike">
+              <a:rPr b="0" lang="lt-LT" sz="2000" spc="-1" strike="noStrike">
                 <a:latin typeface="Arial"/>
               </a:rPr>
               <a:t>Seventh Outline Level</a:t>
             </a:r>
-            <a:endParaRPr b="0" lang="lt-LT" sz="1800" spc="-1" strike="noStrike">
+            <a:endParaRPr b="0" lang="lt-LT" sz="2000" spc="-1" strike="noStrike">
               <a:latin typeface="Arial"/>
             </a:endParaRPr>
           </a:p>
@@ -10083,9 +10086,9 @@
         <p:grpSpPr>
           <a:xfrm>
             <a:off x="11078640" y="458640"/>
-            <a:ext cx="631800" cy="679680"/>
+            <a:ext cx="631440" cy="679320"/>
             <a:chOff x="11078640" y="458640"/>
-            <a:chExt cx="631800" cy="679680"/>
+            <a:chExt cx="631440" cy="679320"/>
           </a:xfrm>
         </p:grpSpPr>
         <p:sp>
@@ -10097,7 +10100,7 @@
           <p:spPr>
             <a:xfrm>
               <a:off x="11078640" y="458640"/>
-              <a:ext cx="631800" cy="679680"/>
+              <a:ext cx="631440" cy="679320"/>
             </a:xfrm>
             <a:custGeom>
               <a:avLst/>
@@ -10218,7 +10221,7 @@
           <p:spPr>
             <a:xfrm>
               <a:off x="11477160" y="873000"/>
-              <a:ext cx="53280" cy="52920"/>
+              <a:ext cx="52920" cy="52560"/>
             </a:xfrm>
             <a:custGeom>
               <a:avLst/>
@@ -10274,7 +10277,7 @@
           <p:spPr>
             <a:xfrm>
               <a:off x="11259360" y="873000"/>
-              <a:ext cx="53280" cy="52920"/>
+              <a:ext cx="52920" cy="52560"/>
             </a:xfrm>
             <a:custGeom>
               <a:avLst/>
@@ -10330,7 +10333,7 @@
           <p:spPr>
             <a:xfrm>
               <a:off x="11175120" y="546480"/>
-              <a:ext cx="439200" cy="434160"/>
+              <a:ext cx="438840" cy="433800"/>
             </a:xfrm>
             <a:custGeom>
               <a:avLst/>
@@ -10936,9 +10939,9 @@
         <p:grpSpPr>
           <a:xfrm>
             <a:off x="11078640" y="458640"/>
-            <a:ext cx="631800" cy="679680"/>
+            <a:ext cx="631440" cy="679320"/>
             <a:chOff x="11078640" y="458640"/>
-            <a:chExt cx="631800" cy="679680"/>
+            <a:chExt cx="631440" cy="679320"/>
           </a:xfrm>
         </p:grpSpPr>
         <p:sp>
@@ -10950,7 +10953,7 @@
           <p:spPr>
             <a:xfrm>
               <a:off x="11078640" y="458640"/>
-              <a:ext cx="631800" cy="679680"/>
+              <a:ext cx="631440" cy="679320"/>
             </a:xfrm>
             <a:custGeom>
               <a:avLst/>
@@ -11071,7 +11074,7 @@
           <p:spPr>
             <a:xfrm>
               <a:off x="11477160" y="873000"/>
-              <a:ext cx="53280" cy="52920"/>
+              <a:ext cx="52920" cy="52560"/>
             </a:xfrm>
             <a:custGeom>
               <a:avLst/>
@@ -11127,7 +11130,7 @@
           <p:spPr>
             <a:xfrm>
               <a:off x="11259360" y="873000"/>
-              <a:ext cx="53280" cy="52920"/>
+              <a:ext cx="52920" cy="52560"/>
             </a:xfrm>
             <a:custGeom>
               <a:avLst/>
@@ -11183,7 +11186,7 @@
           <p:spPr>
             <a:xfrm>
               <a:off x="11175120" y="546480"/>
-              <a:ext cx="439200" cy="434160"/>
+              <a:ext cx="438840" cy="433800"/>
             </a:xfrm>
             <a:custGeom>
               <a:avLst/>
@@ -11789,9 +11792,9 @@
         <p:grpSpPr>
           <a:xfrm>
             <a:off x="11078640" y="458640"/>
-            <a:ext cx="631800" cy="679680"/>
+            <a:ext cx="631440" cy="679320"/>
             <a:chOff x="11078640" y="458640"/>
-            <a:chExt cx="631800" cy="679680"/>
+            <a:chExt cx="631440" cy="679320"/>
           </a:xfrm>
         </p:grpSpPr>
         <p:sp>
@@ -11803,7 +11806,7 @@
           <p:spPr>
             <a:xfrm>
               <a:off x="11078640" y="458640"/>
-              <a:ext cx="631800" cy="679680"/>
+              <a:ext cx="631440" cy="679320"/>
             </a:xfrm>
             <a:custGeom>
               <a:avLst/>
@@ -11924,7 +11927,7 @@
           <p:spPr>
             <a:xfrm>
               <a:off x="11477160" y="873000"/>
-              <a:ext cx="53280" cy="52920"/>
+              <a:ext cx="52920" cy="52560"/>
             </a:xfrm>
             <a:custGeom>
               <a:avLst/>
@@ -11980,7 +11983,7 @@
           <p:spPr>
             <a:xfrm>
               <a:off x="11259360" y="873000"/>
-              <a:ext cx="53280" cy="52920"/>
+              <a:ext cx="52920" cy="52560"/>
             </a:xfrm>
             <a:custGeom>
               <a:avLst/>
@@ -12036,7 +12039,7 @@
           <p:spPr>
             <a:xfrm>
               <a:off x="11175120" y="546480"/>
-              <a:ext cx="439200" cy="434160"/>
+              <a:ext cx="438840" cy="433800"/>
             </a:xfrm>
             <a:custGeom>
               <a:avLst/>
@@ -12372,7 +12375,7 @@
         <p:spPr>
           <a:xfrm>
             <a:off x="-159120" y="-119160"/>
-            <a:ext cx="6253920" cy="7380360"/>
+            <a:ext cx="6253560" cy="7380000"/>
           </a:xfrm>
           <a:custGeom>
             <a:avLst/>
@@ -12428,9 +12431,9 @@
         <p:grpSpPr>
           <a:xfrm>
             <a:off x="11078640" y="458640"/>
-            <a:ext cx="631800" cy="679680"/>
+            <a:ext cx="631440" cy="679320"/>
             <a:chOff x="11078640" y="458640"/>
-            <a:chExt cx="631800" cy="679680"/>
+            <a:chExt cx="631440" cy="679320"/>
           </a:xfrm>
         </p:grpSpPr>
         <p:sp>
@@ -12442,7 +12445,7 @@
           <p:spPr>
             <a:xfrm>
               <a:off x="11078640" y="458640"/>
-              <a:ext cx="631800" cy="679680"/>
+              <a:ext cx="631440" cy="679320"/>
             </a:xfrm>
             <a:custGeom>
               <a:avLst/>
@@ -12563,7 +12566,7 @@
           <p:spPr>
             <a:xfrm>
               <a:off x="11477160" y="873000"/>
-              <a:ext cx="53280" cy="52920"/>
+              <a:ext cx="52920" cy="52560"/>
             </a:xfrm>
             <a:custGeom>
               <a:avLst/>
@@ -12619,7 +12622,7 @@
           <p:spPr>
             <a:xfrm>
               <a:off x="11259360" y="873000"/>
-              <a:ext cx="53280" cy="52920"/>
+              <a:ext cx="52920" cy="52560"/>
             </a:xfrm>
             <a:custGeom>
               <a:avLst/>
@@ -12675,7 +12678,7 @@
           <p:spPr>
             <a:xfrm>
               <a:off x="11175120" y="546480"/>
-              <a:ext cx="439200" cy="434160"/>
+              <a:ext cx="438840" cy="433800"/>
             </a:xfrm>
             <a:custGeom>
               <a:avLst/>
@@ -13281,9 +13284,9 @@
         <p:grpSpPr>
           <a:xfrm>
             <a:off x="11078640" y="458640"/>
-            <a:ext cx="631800" cy="679680"/>
+            <a:ext cx="631440" cy="679320"/>
             <a:chOff x="11078640" y="458640"/>
-            <a:chExt cx="631800" cy="679680"/>
+            <a:chExt cx="631440" cy="679320"/>
           </a:xfrm>
         </p:grpSpPr>
         <p:sp>
@@ -13295,7 +13298,7 @@
           <p:spPr>
             <a:xfrm>
               <a:off x="11078640" y="458640"/>
-              <a:ext cx="631800" cy="679680"/>
+              <a:ext cx="631440" cy="679320"/>
             </a:xfrm>
             <a:custGeom>
               <a:avLst/>
@@ -13416,7 +13419,7 @@
           <p:spPr>
             <a:xfrm>
               <a:off x="11477160" y="873000"/>
-              <a:ext cx="53280" cy="52920"/>
+              <a:ext cx="52920" cy="52560"/>
             </a:xfrm>
             <a:custGeom>
               <a:avLst/>
@@ -13472,7 +13475,7 @@
           <p:spPr>
             <a:xfrm>
               <a:off x="11259360" y="873000"/>
-              <a:ext cx="53280" cy="52920"/>
+              <a:ext cx="52920" cy="52560"/>
             </a:xfrm>
             <a:custGeom>
               <a:avLst/>
@@ -13528,7 +13531,7 @@
           <p:spPr>
             <a:xfrm>
               <a:off x="11175120" y="546480"/>
-              <a:ext cx="439200" cy="434160"/>
+              <a:ext cx="438840" cy="433800"/>
             </a:xfrm>
             <a:custGeom>
               <a:avLst/>
@@ -13864,9 +13867,9 @@
         <p:grpSpPr>
           <a:xfrm>
             <a:off x="11078640" y="458640"/>
-            <a:ext cx="631800" cy="679680"/>
+            <a:ext cx="631440" cy="679320"/>
             <a:chOff x="11078640" y="458640"/>
-            <a:chExt cx="631800" cy="679680"/>
+            <a:chExt cx="631440" cy="679320"/>
           </a:xfrm>
         </p:grpSpPr>
         <p:sp>
@@ -13878,7 +13881,7 @@
           <p:spPr>
             <a:xfrm>
               <a:off x="11220120" y="846720"/>
-              <a:ext cx="131760" cy="105840"/>
+              <a:ext cx="131400" cy="105480"/>
             </a:xfrm>
             <a:custGeom>
               <a:avLst/>
@@ -13970,7 +13973,7 @@
           <p:spPr>
             <a:xfrm>
               <a:off x="11216880" y="710280"/>
-              <a:ext cx="356040" cy="122400"/>
+              <a:ext cx="355680" cy="122040"/>
             </a:xfrm>
             <a:custGeom>
               <a:avLst/>
@@ -14102,7 +14105,7 @@
           <p:spPr>
             <a:xfrm>
               <a:off x="11437560" y="846720"/>
-              <a:ext cx="131760" cy="105840"/>
+              <a:ext cx="131400" cy="105480"/>
             </a:xfrm>
             <a:custGeom>
               <a:avLst/>
@@ -14194,7 +14197,7 @@
           <p:spPr>
             <a:xfrm>
               <a:off x="11078640" y="458640"/>
-              <a:ext cx="631800" cy="679680"/>
+              <a:ext cx="631440" cy="679320"/>
             </a:xfrm>
             <a:custGeom>
               <a:avLst/>
@@ -14677,9 +14680,9 @@
         <p:grpSpPr>
           <a:xfrm>
             <a:off x="11078640" y="458640"/>
-            <a:ext cx="631800" cy="679680"/>
+            <a:ext cx="631440" cy="679320"/>
             <a:chOff x="11078640" y="458640"/>
-            <a:chExt cx="631800" cy="679680"/>
+            <a:chExt cx="631440" cy="679320"/>
           </a:xfrm>
         </p:grpSpPr>
         <p:sp>
@@ -14691,7 +14694,7 @@
           <p:spPr>
             <a:xfrm>
               <a:off x="11078640" y="458640"/>
-              <a:ext cx="631800" cy="679680"/>
+              <a:ext cx="631440" cy="679320"/>
             </a:xfrm>
             <a:custGeom>
               <a:avLst/>
@@ -14812,7 +14815,7 @@
           <p:spPr>
             <a:xfrm>
               <a:off x="11477160" y="873000"/>
-              <a:ext cx="53280" cy="52920"/>
+              <a:ext cx="52920" cy="52560"/>
             </a:xfrm>
             <a:custGeom>
               <a:avLst/>
@@ -14868,7 +14871,7 @@
           <p:spPr>
             <a:xfrm>
               <a:off x="11259360" y="873000"/>
-              <a:ext cx="53280" cy="52920"/>
+              <a:ext cx="52920" cy="52560"/>
             </a:xfrm>
             <a:custGeom>
               <a:avLst/>
@@ -14924,7 +14927,7 @@
           <p:spPr>
             <a:xfrm>
               <a:off x="11175120" y="546480"/>
-              <a:ext cx="439200" cy="434160"/>
+              <a:ext cx="438840" cy="433800"/>
             </a:xfrm>
             <a:custGeom>
               <a:avLst/>
@@ -15523,7 +15526,7 @@
         <p:spPr>
           <a:xfrm>
             <a:off x="3273120" y="2618280"/>
-            <a:ext cx="7049160" cy="2386440"/>
+            <a:ext cx="7048800" cy="2386080"/>
           </a:xfrm>
           <a:prstGeom prst="rect">
             <a:avLst/>
@@ -15575,7 +15578,7 @@
         <p:spPr>
           <a:xfrm>
             <a:off x="3273120" y="5916960"/>
-            <a:ext cx="7049160" cy="926640"/>
+            <a:ext cx="7048800" cy="926280"/>
           </a:xfrm>
           <a:prstGeom prst="rect">
             <a:avLst/>
@@ -15630,7 +15633,7 @@
         <p:spPr>
           <a:xfrm>
             <a:off x="495720" y="5930280"/>
-            <a:ext cx="2266560" cy="333000"/>
+            <a:ext cx="2266200" cy="333000"/>
           </a:xfrm>
           <a:prstGeom prst="rect">
             <a:avLst/>
@@ -15686,7 +15689,7 @@
         <p:spPr>
           <a:xfrm>
             <a:off x="14449320" y="-1709640"/>
-            <a:ext cx="1834200" cy="1834200"/>
+            <a:ext cx="1833840" cy="1833840"/>
           </a:xfrm>
           <a:prstGeom prst="rect">
             <a:avLst/>
@@ -15705,9 +15708,9 @@
         <p:grpSpPr>
           <a:xfrm>
             <a:off x="9866160" y="2715120"/>
-            <a:ext cx="1834200" cy="463320"/>
+            <a:ext cx="1833840" cy="462960"/>
             <a:chOff x="9866160" y="2715120"/>
-            <a:chExt cx="1834200" cy="463320"/>
+            <a:chExt cx="1833840" cy="462960"/>
           </a:xfrm>
         </p:grpSpPr>
         <p:sp>
@@ -15719,7 +15722,7 @@
           <p:spPr>
             <a:xfrm>
               <a:off x="9866160" y="2715120"/>
-              <a:ext cx="1834200" cy="463320"/>
+              <a:ext cx="1833840" cy="462960"/>
             </a:xfrm>
             <a:prstGeom prst="roundRect">
               <a:avLst>
@@ -15749,7 +15752,7 @@
           <p:spPr>
             <a:xfrm>
               <a:off x="9979920" y="2779920"/>
-              <a:ext cx="1606680" cy="333360"/>
+              <a:ext cx="1606320" cy="333000"/>
             </a:xfrm>
             <a:prstGeom prst="rect">
               <a:avLst/>
@@ -15806,7 +15809,7 @@
         <p:spPr>
           <a:xfrm>
             <a:off x="9920160" y="406080"/>
-            <a:ext cx="1951560" cy="1951560"/>
+            <a:ext cx="1951200" cy="1951200"/>
           </a:xfrm>
           <a:prstGeom prst="rect">
             <a:avLst/>
@@ -15855,7 +15858,7 @@
         <p:spPr>
           <a:xfrm>
             <a:off x="6450480" y="2908800"/>
-            <a:ext cx="5429880" cy="1987560"/>
+            <a:ext cx="5429520" cy="1987200"/>
           </a:xfrm>
           <a:prstGeom prst="rect">
             <a:avLst/>
@@ -15907,7 +15910,7 @@
         <p:spPr>
           <a:xfrm>
             <a:off x="480240" y="460800"/>
-            <a:ext cx="5614560" cy="452520"/>
+            <a:ext cx="5614200" cy="452160"/>
           </a:xfrm>
           <a:prstGeom prst="rect">
             <a:avLst/>
@@ -15966,7 +15969,7 @@
         <p:spPr>
           <a:xfrm>
             <a:off x="538200" y="2463480"/>
-            <a:ext cx="4681800" cy="930240"/>
+            <a:ext cx="4681440" cy="929880"/>
           </a:xfrm>
           <a:prstGeom prst="rect">
             <a:avLst/>
@@ -15989,7 +15992,7 @@
         <p:spPr>
           <a:xfrm>
             <a:off x="300960" y="3579840"/>
-            <a:ext cx="5265720" cy="657000"/>
+            <a:ext cx="5265360" cy="656640"/>
           </a:xfrm>
           <a:prstGeom prst="rect">
             <a:avLst/>
@@ -16038,7 +16041,7 @@
         <p:spPr>
           <a:xfrm>
             <a:off x="6450480" y="2908800"/>
-            <a:ext cx="5429880" cy="1987560"/>
+            <a:ext cx="5429520" cy="1987200"/>
           </a:xfrm>
           <a:prstGeom prst="rect">
             <a:avLst/>
@@ -16090,7 +16093,7 @@
         <p:spPr>
           <a:xfrm>
             <a:off x="480240" y="460800"/>
-            <a:ext cx="5614560" cy="452520"/>
+            <a:ext cx="5614200" cy="452160"/>
           </a:xfrm>
           <a:prstGeom prst="rect">
             <a:avLst/>
@@ -16149,7 +16152,7 @@
         <p:spPr>
           <a:xfrm>
             <a:off x="409680" y="2952720"/>
-            <a:ext cx="4998600" cy="842760"/>
+            <a:ext cx="4998240" cy="842400"/>
           </a:xfrm>
           <a:prstGeom prst="rect">
             <a:avLst/>
@@ -16198,7 +16201,7 @@
         <p:spPr>
           <a:xfrm>
             <a:off x="6450480" y="2908800"/>
-            <a:ext cx="5429880" cy="1987560"/>
+            <a:ext cx="5429520" cy="1987200"/>
           </a:xfrm>
           <a:prstGeom prst="rect">
             <a:avLst/>
@@ -16263,7 +16266,7 @@
         <p:spPr>
           <a:xfrm>
             <a:off x="480240" y="460800"/>
-            <a:ext cx="5614560" cy="452520"/>
+            <a:ext cx="5614200" cy="452160"/>
           </a:xfrm>
           <a:prstGeom prst="rect">
             <a:avLst/>
@@ -16322,7 +16325,7 @@
         <p:spPr>
           <a:xfrm>
             <a:off x="617400" y="1185840"/>
-            <a:ext cx="4220280" cy="5307840"/>
+            <a:ext cx="4219920" cy="5307480"/>
           </a:xfrm>
           <a:prstGeom prst="rect">
             <a:avLst/>
@@ -16371,7 +16374,7 @@
         <p:spPr>
           <a:xfrm>
             <a:off x="6450480" y="2908800"/>
-            <a:ext cx="5429880" cy="1987560"/>
+            <a:ext cx="5429520" cy="1987200"/>
           </a:xfrm>
           <a:prstGeom prst="rect">
             <a:avLst/>
@@ -16436,7 +16439,7 @@
         <p:spPr>
           <a:xfrm>
             <a:off x="480240" y="460800"/>
-            <a:ext cx="5614560" cy="452520"/>
+            <a:ext cx="5614200" cy="452160"/>
           </a:xfrm>
           <a:prstGeom prst="rect">
             <a:avLst/>
@@ -16495,7 +16498,7 @@
         <p:spPr>
           <a:xfrm>
             <a:off x="510480" y="1162440"/>
-            <a:ext cx="4586040" cy="5072760"/>
+            <a:ext cx="4585680" cy="5072400"/>
           </a:xfrm>
           <a:prstGeom prst="rect">
             <a:avLst/>
@@ -16544,7 +16547,7 @@
         <p:spPr>
           <a:xfrm>
             <a:off x="480240" y="460800"/>
-            <a:ext cx="5614560" cy="452520"/>
+            <a:ext cx="5614200" cy="452160"/>
           </a:xfrm>
           <a:prstGeom prst="rect">
             <a:avLst/>
@@ -16599,9 +16602,9 @@
         <p:grpSpPr>
           <a:xfrm>
             <a:off x="479880" y="898200"/>
-            <a:ext cx="1834200" cy="463320"/>
+            <a:ext cx="1833840" cy="462960"/>
             <a:chOff x="479880" y="898200"/>
-            <a:chExt cx="1834200" cy="463320"/>
+            <a:chExt cx="1833840" cy="462960"/>
           </a:xfrm>
         </p:grpSpPr>
         <p:sp>
@@ -16613,7 +16616,7 @@
           <p:spPr>
             <a:xfrm>
               <a:off x="479880" y="898200"/>
-              <a:ext cx="1834200" cy="463320"/>
+              <a:ext cx="1833840" cy="462960"/>
             </a:xfrm>
             <a:prstGeom prst="roundRect">
               <a:avLst>
@@ -16643,7 +16646,7 @@
           <p:spPr>
             <a:xfrm>
               <a:off x="593640" y="962640"/>
-              <a:ext cx="1606680" cy="333720"/>
+              <a:ext cx="1606320" cy="333360"/>
             </a:xfrm>
             <a:prstGeom prst="rect">
               <a:avLst/>
@@ -16700,7 +16703,7 @@
         <p:spPr>
           <a:xfrm>
             <a:off x="479880" y="1441440"/>
-            <a:ext cx="11230920" cy="5227200"/>
+            <a:ext cx="11230560" cy="5226840"/>
           </a:xfrm>
           <a:prstGeom prst="rect">
             <a:avLst/>
@@ -16719,7 +16722,7 @@
         <p:spPr>
           <a:xfrm>
             <a:off x="594000" y="1832400"/>
-            <a:ext cx="10718280" cy="4563720"/>
+            <a:ext cx="10717920" cy="4563360"/>
           </a:xfrm>
           <a:prstGeom prst="rect">
             <a:avLst/>
@@ -16916,7 +16919,7 @@
         <p:spPr>
           <a:xfrm>
             <a:off x="480240" y="460800"/>
-            <a:ext cx="5614560" cy="452520"/>
+            <a:ext cx="5614200" cy="452160"/>
           </a:xfrm>
           <a:prstGeom prst="rect">
             <a:avLst/>
@@ -16971,9 +16974,9 @@
         <p:grpSpPr>
           <a:xfrm>
             <a:off x="479880" y="898200"/>
-            <a:ext cx="1834200" cy="463320"/>
+            <a:ext cx="1833840" cy="462960"/>
             <a:chOff x="479880" y="898200"/>
-            <a:chExt cx="1834200" cy="463320"/>
+            <a:chExt cx="1833840" cy="462960"/>
           </a:xfrm>
         </p:grpSpPr>
         <p:sp>
@@ -16985,7 +16988,7 @@
           <p:spPr>
             <a:xfrm>
               <a:off x="479880" y="898200"/>
-              <a:ext cx="1834200" cy="463320"/>
+              <a:ext cx="1833840" cy="462960"/>
             </a:xfrm>
             <a:prstGeom prst="roundRect">
               <a:avLst>
@@ -17015,7 +17018,7 @@
           <p:spPr>
             <a:xfrm>
               <a:off x="593640" y="962640"/>
-              <a:ext cx="1606680" cy="333720"/>
+              <a:ext cx="1606320" cy="333360"/>
             </a:xfrm>
             <a:prstGeom prst="rect">
               <a:avLst/>
@@ -17072,7 +17075,7 @@
         <p:spPr>
           <a:xfrm>
             <a:off x="479880" y="1441440"/>
-            <a:ext cx="11230920" cy="5227200"/>
+            <a:ext cx="11230560" cy="5226840"/>
           </a:xfrm>
           <a:prstGeom prst="rect">
             <a:avLst/>
@@ -17091,7 +17094,7 @@
         <p:spPr>
           <a:xfrm>
             <a:off x="594000" y="1832400"/>
-            <a:ext cx="10718280" cy="4563720"/>
+            <a:ext cx="10717920" cy="4563360"/>
           </a:xfrm>
           <a:prstGeom prst="rect">
             <a:avLst/>
@@ -17147,7 +17150,7 @@
                 <a:srgbClr val="000000"/>
               </a:buClr>
               <a:buFont typeface="Arial"/>
-              <a:buChar char="•"/>
+              <a:buAutoNum type="arabicParenR"/>
             </a:pPr>
             <a:r>
               <a:rPr b="0" lang="lt-LT" sz="1400" spc="-1" strike="noStrike">
@@ -17157,7 +17160,7 @@
                 <a:latin typeface="Arial"/>
                 <a:ea typeface="Arial"/>
               </a:rPr>
-              <a:t>Sukurtų lentelę darbuotojai, kurie turėtų ID, vardą, pavardę ir pareigas. ID turi atsirasti automatiškai, jų nereikia nurodyti per programą.</a:t>
+              <a:t>Sukurtų ORM objektą, kuris turėtų ID, vardą, pavardę ir pareigas. ID turi atsirasti automatiškai, jų nereikia nurodyti per programą.</a:t>
             </a:r>
             <a:endParaRPr b="0" lang="lt-LT" sz="1400" spc="-1" strike="noStrike">
               <a:latin typeface="Arial"/>
@@ -17175,7 +17178,7 @@
                 <a:srgbClr val="000000"/>
               </a:buClr>
               <a:buFont typeface="Arial"/>
-              <a:buChar char="•"/>
+              <a:buAutoNum type="arabicParenR"/>
             </a:pPr>
             <a:r>
               <a:rPr b="0" lang="lt-LT" sz="1400" spc="-1" strike="noStrike">
@@ -17185,7 +17188,7 @@
                 <a:latin typeface="Arial"/>
                 <a:ea typeface="Arial"/>
               </a:rPr>
-              <a:t>Sukurti lentelę mentoriai, kuri turėtų Mentoriaus ID ir Mokinio ID. </a:t>
+              <a:t>Sukurti ORM objektą, kuris turėtų Mentoriaus ID ir Mokinio ID. </a:t>
             </a:r>
             <a:endParaRPr b="0" lang="lt-LT" sz="1400" spc="-1" strike="noStrike">
               <a:latin typeface="Arial"/>
@@ -17203,7 +17206,7 @@
                 <a:srgbClr val="000000"/>
               </a:buClr>
               <a:buFont typeface="Arial"/>
-              <a:buChar char="•"/>
+              <a:buAutoNum type="arabicParenR"/>
             </a:pPr>
             <a:r>
               <a:rPr b="0" lang="lt-LT" sz="1400" spc="-1" strike="noStrike">
@@ -17213,7 +17216,7 @@
                 <a:latin typeface="Arial"/>
                 <a:ea typeface="Arial"/>
               </a:rPr>
-              <a:t>Užpildyti abi lenteles.</a:t>
+              <a:t>Parašyti Unit testą, kuris užtikrintų, kad nurodžius darbuotojo(mentoriaus) vardą ir pavardę, gaunami mentorių vardai ir pavardės ir pavaldinių vardai, pavardės ir pareigos.</a:t>
             </a:r>
             <a:endParaRPr b="0" lang="lt-LT" sz="1400" spc="-1" strike="noStrike">
               <a:latin typeface="Arial"/>
@@ -17231,7 +17234,7 @@
                 <a:srgbClr val="000000"/>
               </a:buClr>
               <a:buFont typeface="Arial"/>
-              <a:buChar char="•"/>
+              <a:buAutoNum type="arabicParenR"/>
             </a:pPr>
             <a:r>
               <a:rPr b="0" lang="lt-LT" sz="1400" spc="-1" strike="noStrike">
@@ -17241,7 +17244,17 @@
                 <a:latin typeface="Arial"/>
                 <a:ea typeface="Arial"/>
               </a:rPr>
-              <a:t>Parašyti Unit testą, kurie užtikrintų, kad žmogus negali būti savo paties mentorium.</a:t>
+              <a:t>Parašyti programą, kuri praeitų abu testus (</a:t>
+            </a:r>
+            <a:r>
+              <a:rPr b="0" lang="lt-LT" sz="1400" spc="-1" strike="noStrike">
+                <a:solidFill>
+                  <a:srgbClr val="000000"/>
+                </a:solidFill>
+                <a:latin typeface="Arial"/>
+                <a:ea typeface="Arial"/>
+              </a:rPr>
+              <a:t>Parašyti funkcijas, leidžiančias įterpti darbuotoją ir mentorius į duomenų bazę. Taip pat parašyti funkciją, kuri pagal mentoriaus vardą ir pavardę gražintų sąrašą žodynų, su mentoriaus ir jo mokinio duomenimis.)</a:t>
             </a:r>
             <a:endParaRPr b="0" lang="lt-LT" sz="1400" spc="-1" strike="noStrike">
               <a:latin typeface="Arial"/>
@@ -17259,7 +17272,7 @@
                 <a:srgbClr val="000000"/>
               </a:buClr>
               <a:buFont typeface="Arial"/>
-              <a:buChar char="•"/>
+              <a:buAutoNum type="arabicParenR"/>
             </a:pPr>
             <a:r>
               <a:rPr b="0" lang="lt-LT" sz="1400" spc="-1" strike="noStrike">
@@ -17269,7 +17282,7 @@
                 <a:latin typeface="Arial"/>
                 <a:ea typeface="Arial"/>
               </a:rPr>
-              <a:t>Parašyti Unit testą, kuris užtikrintų, kad nurodžius žmogaus vardą ir pavardę, gaunami mentorių vardai ir pavardės ir pavaldinių vardai, pavardės ir pareigos.</a:t>
+              <a:t>Pakeisti pirmą sąlygą taip, kad kuriant darbuotojus būtų galima nurodyti jų ID</a:t>
             </a:r>
             <a:endParaRPr b="0" lang="lt-LT" sz="1400" spc="-1" strike="noStrike">
               <a:latin typeface="Arial"/>
@@ -17287,7 +17300,7 @@
                 <a:srgbClr val="000000"/>
               </a:buClr>
               <a:buFont typeface="Arial"/>
-              <a:buChar char="•"/>
+              <a:buAutoNum type="arabicParenR"/>
             </a:pPr>
             <a:r>
               <a:rPr b="0" lang="lt-LT" sz="1400" spc="-1" strike="noStrike">
@@ -17297,8 +17310,102 @@
                 <a:latin typeface="Arial"/>
                 <a:ea typeface="Arial"/>
               </a:rPr>
-              <a:t>Parašyti programą, kuri praeitų abu testus</a:t>
+              <a:t>Parašyti Unit testą, kuris užtikrintų, kad darbuotojas negali būti savo paties mentorius. Šis testas turi testuoti „set_mentor“ metodą. </a:t>
             </a:r>
+            <a:endParaRPr b="0" lang="lt-LT" sz="1400" spc="-1" strike="noStrike">
+              <a:latin typeface="Arial"/>
+            </a:endParaRPr>
+          </a:p>
+          <a:p>
+            <a:pPr marL="285840" indent="-285480">
+              <a:lnSpc>
+                <a:spcPct val="90000"/>
+              </a:lnSpc>
+              <a:spcBef>
+                <a:spcPts val="1001"/>
+              </a:spcBef>
+              <a:buClr>
+                <a:srgbClr val="000000"/>
+              </a:buClr>
+              <a:buFont typeface="Arial"/>
+              <a:buAutoNum type="arabicParenR"/>
+            </a:pPr>
+            <a:r>
+              <a:rPr b="0" lang="lt-LT" sz="1400" spc="-1" strike="noStrike">
+                <a:solidFill>
+                  <a:srgbClr val="000000"/>
+                </a:solidFill>
+                <a:latin typeface="Arial"/>
+                <a:ea typeface="Arial"/>
+              </a:rPr>
+              <a:t>Parašyti Unit testą, kuris užtikrintų, kad darbuotojas gali turėti tik vieną mentorių. Šis testas turi testuoti „set_mentor“ metodą.</a:t>
+            </a:r>
+            <a:endParaRPr b="0" lang="lt-LT" sz="1400" spc="-1" strike="noStrike">
+              <a:latin typeface="Arial"/>
+            </a:endParaRPr>
+          </a:p>
+          <a:p>
+            <a:pPr marL="285840" indent="-285480">
+              <a:lnSpc>
+                <a:spcPct val="90000"/>
+              </a:lnSpc>
+              <a:spcBef>
+                <a:spcPts val="1001"/>
+              </a:spcBef>
+              <a:buClr>
+                <a:srgbClr val="000000"/>
+              </a:buClr>
+              <a:buFont typeface="Arial"/>
+              <a:buAutoNum type="arabicParenR"/>
+            </a:pPr>
+            <a:endParaRPr b="0" lang="lt-LT" sz="1400" spc="-1" strike="noStrike">
+              <a:latin typeface="Arial"/>
+            </a:endParaRPr>
+          </a:p>
+          <a:p>
+            <a:pPr marL="216000" indent="-216000">
+              <a:lnSpc>
+                <a:spcPct val="100000"/>
+              </a:lnSpc>
+              <a:buClr>
+                <a:srgbClr val="ffffff"/>
+              </a:buClr>
+              <a:buAutoNum type="arabicParenR"/>
+            </a:pPr>
+            <a:r>
+              <a:rPr b="0" lang="lt-LT" sz="1400" spc="-1" strike="noStrike">
+                <a:solidFill>
+                  <a:srgbClr val="000000"/>
+                </a:solidFill>
+                <a:latin typeface="Arial"/>
+                <a:ea typeface="Arial"/>
+              </a:rPr>
+              <a:t>Papildyti programą nauja lentele „Grade“. Įvertinimas turi stulpelius „worker_id“ ir „grade“. Parašyti funkciją „get_student_grade“, kuri, pagal darbuotojo vardą ir pavardę, gražintų </a:t>
+            </a:r>
+            <a:r>
+              <a:rPr b="0" lang="lt-LT" sz="1400" spc="-1" strike="noStrike">
+                <a:solidFill>
+                  <a:srgbClr val="000000"/>
+                </a:solidFill>
+                <a:latin typeface="Arial"/>
+                <a:ea typeface="Arial"/>
+              </a:rPr>
+              <a:t>jo įvertinimą stringu, pvz. „9“. Jei darbuotojas neturi mentoriaus, funkcija turi gražinti stringą „{name} {surname} is not a student“. Jei darbuotojas neturi įvertinimo, funkcija turi gražinti stringą „{name} {surname} is not graded“. Parašyti šiai funkcijai Unit testą.</a:t>
+            </a:r>
+            <a:endParaRPr b="0" lang="lt-LT" sz="1400" spc="-1" strike="noStrike">
+              <a:latin typeface="Arial"/>
+            </a:endParaRPr>
+          </a:p>
+          <a:p>
+            <a:pPr marL="216000" indent="-216000">
+              <a:lnSpc>
+                <a:spcPct val="100000"/>
+              </a:lnSpc>
+              <a:buClr>
+                <a:srgbClr val="ffffff"/>
+              </a:buClr>
+              <a:buAutoNum type="arabicParenR"/>
+            </a:pPr>
             <a:endParaRPr b="0" lang="lt-LT" sz="1400" spc="-1" strike="noStrike">
               <a:latin typeface="Arial"/>
             </a:endParaRPr>
@@ -17372,7 +17479,7 @@
         <p:spPr>
           <a:xfrm>
             <a:off x="480240" y="460800"/>
-            <a:ext cx="5614560" cy="452520"/>
+            <a:ext cx="5614200" cy="452160"/>
           </a:xfrm>
           <a:prstGeom prst="rect">
             <a:avLst/>
@@ -17427,9 +17534,9 @@
         <p:grpSpPr>
           <a:xfrm>
             <a:off x="480240" y="914400"/>
-            <a:ext cx="1834200" cy="463320"/>
+            <a:ext cx="1833840" cy="462960"/>
             <a:chOff x="480240" y="914400"/>
-            <a:chExt cx="1834200" cy="463320"/>
+            <a:chExt cx="1833840" cy="462960"/>
           </a:xfrm>
         </p:grpSpPr>
         <p:sp>
@@ -17441,7 +17548,7 @@
           <p:spPr>
             <a:xfrm>
               <a:off x="480240" y="914400"/>
-              <a:ext cx="1834200" cy="463320"/>
+              <a:ext cx="1833840" cy="462960"/>
             </a:xfrm>
             <a:prstGeom prst="roundRect">
               <a:avLst>
@@ -17471,7 +17578,7 @@
           <p:spPr>
             <a:xfrm>
               <a:off x="594000" y="978840"/>
-              <a:ext cx="1606680" cy="333720"/>
+              <a:ext cx="1606320" cy="333360"/>
             </a:xfrm>
             <a:prstGeom prst="rect">
               <a:avLst/>
@@ -17528,7 +17635,7 @@
         <p:spPr>
           <a:xfrm>
             <a:off x="479880" y="1441440"/>
-            <a:ext cx="11230920" cy="5227200"/>
+            <a:ext cx="11230560" cy="5226840"/>
           </a:xfrm>
           <a:prstGeom prst="rect">
             <a:avLst/>
@@ -17547,7 +17654,7 @@
         <p:spPr>
           <a:xfrm>
             <a:off x="594000" y="1832400"/>
-            <a:ext cx="10718280" cy="4563720"/>
+            <a:ext cx="10717920" cy="4563360"/>
           </a:xfrm>
           <a:prstGeom prst="rect">
             <a:avLst/>
@@ -17632,7 +17739,7 @@
         <p:spPr>
           <a:xfrm>
             <a:off x="480240" y="460800"/>
-            <a:ext cx="5614560" cy="452520"/>
+            <a:ext cx="5614200" cy="452160"/>
           </a:xfrm>
           <a:prstGeom prst="rect">
             <a:avLst/>
@@ -17687,7 +17794,7 @@
         <p:spPr>
           <a:xfrm>
             <a:off x="3281760" y="1821960"/>
-            <a:ext cx="3749760" cy="328680"/>
+            <a:ext cx="3749400" cy="328320"/>
           </a:xfrm>
           <a:prstGeom prst="rect">
             <a:avLst/>
@@ -17742,7 +17849,7 @@
         <p:spPr>
           <a:xfrm>
             <a:off x="3281760" y="2171520"/>
-            <a:ext cx="3749760" cy="503280"/>
+            <a:ext cx="3749400" cy="502920"/>
           </a:xfrm>
           <a:prstGeom prst="rect">
             <a:avLst/>
@@ -17797,7 +17904,7 @@
         <p:spPr>
           <a:xfrm>
             <a:off x="480240" y="5032080"/>
-            <a:ext cx="2342520" cy="1364040"/>
+            <a:ext cx="2342160" cy="1363680"/>
           </a:xfrm>
           <a:prstGeom prst="rect">
             <a:avLst/>
@@ -17849,7 +17956,7 @@
         <p:spPr>
           <a:xfrm>
             <a:off x="7503480" y="1821960"/>
-            <a:ext cx="4206960" cy="790200"/>
+            <a:ext cx="4206600" cy="789840"/>
           </a:xfrm>
           <a:prstGeom prst="rect">
             <a:avLst/>
@@ -17936,7 +18043,7 @@
         <p:spPr>
           <a:xfrm>
             <a:off x="480240" y="460800"/>
-            <a:ext cx="5614560" cy="452520"/>
+            <a:ext cx="5614200" cy="452160"/>
           </a:xfrm>
           <a:prstGeom prst="rect">
             <a:avLst/>
@@ -17991,7 +18098,7 @@
         <p:spPr>
           <a:xfrm>
             <a:off x="480240" y="1371600"/>
-            <a:ext cx="5152680" cy="1364040"/>
+            <a:ext cx="5152320" cy="1363680"/>
           </a:xfrm>
           <a:prstGeom prst="rect">
             <a:avLst/>
@@ -18043,7 +18150,7 @@
         <p:spPr>
           <a:xfrm>
             <a:off x="1398600" y="3347640"/>
-            <a:ext cx="4234680" cy="360360"/>
+            <a:ext cx="4234320" cy="360000"/>
           </a:xfrm>
           <a:prstGeom prst="rect">
             <a:avLst/>
@@ -18098,7 +18205,7 @@
         <p:spPr>
           <a:xfrm>
             <a:off x="1398600" y="4606560"/>
-            <a:ext cx="4234680" cy="640080"/>
+            <a:ext cx="4234320" cy="639720"/>
           </a:xfrm>
           <a:prstGeom prst="rect">
             <a:avLst/>
@@ -18153,7 +18260,7 @@
         <p:spPr>
           <a:xfrm>
             <a:off x="1398600" y="5701320"/>
-            <a:ext cx="4234680" cy="900720"/>
+            <a:ext cx="4234320" cy="900360"/>
           </a:xfrm>
           <a:prstGeom prst="rect">
             <a:avLst/>
@@ -18208,9 +18315,9 @@
         <p:grpSpPr>
           <a:xfrm>
             <a:off x="480240" y="3193560"/>
-            <a:ext cx="730440" cy="730440"/>
+            <a:ext cx="730080" cy="730080"/>
             <a:chOff x="480240" y="3193560"/>
-            <a:chExt cx="730440" cy="730440"/>
+            <a:chExt cx="730080" cy="730080"/>
           </a:xfrm>
         </p:grpSpPr>
         <p:sp>
@@ -18222,7 +18329,7 @@
           <p:spPr>
             <a:xfrm>
               <a:off x="480240" y="3193560"/>
-              <a:ext cx="730440" cy="730440"/>
+              <a:ext cx="730080" cy="730080"/>
             </a:xfrm>
             <a:prstGeom prst="ellipse">
               <a:avLst/>
@@ -18250,7 +18357,7 @@
           <p:spPr>
             <a:xfrm>
               <a:off x="633240" y="3360960"/>
-              <a:ext cx="424800" cy="394920"/>
+              <a:ext cx="424440" cy="394560"/>
             </a:xfrm>
             <a:prstGeom prst="rect">
               <a:avLst/>
@@ -18303,9 +18410,9 @@
         <p:grpSpPr>
           <a:xfrm>
             <a:off x="480240" y="4403160"/>
-            <a:ext cx="730440" cy="730440"/>
+            <a:ext cx="730080" cy="730080"/>
             <a:chOff x="480240" y="4403160"/>
-            <a:chExt cx="730440" cy="730440"/>
+            <a:chExt cx="730080" cy="730080"/>
           </a:xfrm>
         </p:grpSpPr>
         <p:sp>
@@ -18317,7 +18424,7 @@
           <p:spPr>
             <a:xfrm>
               <a:off x="480240" y="4403160"/>
-              <a:ext cx="730440" cy="730440"/>
+              <a:ext cx="730080" cy="730080"/>
             </a:xfrm>
             <a:prstGeom prst="ellipse">
               <a:avLst/>
@@ -18345,7 +18452,7 @@
           <p:spPr>
             <a:xfrm>
               <a:off x="633240" y="4570920"/>
-              <a:ext cx="424800" cy="394920"/>
+              <a:ext cx="424440" cy="394560"/>
             </a:xfrm>
             <a:prstGeom prst="rect">
               <a:avLst/>
@@ -18398,9 +18505,9 @@
         <p:grpSpPr>
           <a:xfrm>
             <a:off x="480240" y="5514480"/>
-            <a:ext cx="730440" cy="730440"/>
+            <a:ext cx="730080" cy="730080"/>
             <a:chOff x="480240" y="5514480"/>
-            <a:chExt cx="730440" cy="730440"/>
+            <a:chExt cx="730080" cy="730080"/>
           </a:xfrm>
         </p:grpSpPr>
         <p:sp>
@@ -18412,7 +18519,7 @@
           <p:spPr>
             <a:xfrm>
               <a:off x="480240" y="5514480"/>
-              <a:ext cx="730440" cy="730440"/>
+              <a:ext cx="730080" cy="730080"/>
             </a:xfrm>
             <a:prstGeom prst="ellipse">
               <a:avLst/>
@@ -18440,7 +18547,7 @@
           <p:spPr>
             <a:xfrm>
               <a:off x="633240" y="5682240"/>
-              <a:ext cx="424800" cy="394920"/>
+              <a:ext cx="424440" cy="394560"/>
             </a:xfrm>
             <a:prstGeom prst="rect">
               <a:avLst/>
@@ -18523,7 +18630,7 @@
         <p:spPr>
           <a:xfrm>
             <a:off x="480240" y="460800"/>
-            <a:ext cx="5614560" cy="452520"/>
+            <a:ext cx="5614200" cy="452160"/>
           </a:xfrm>
           <a:prstGeom prst="rect">
             <a:avLst/>
@@ -18578,7 +18685,7 @@
         <p:spPr>
           <a:xfrm>
             <a:off x="480240" y="1371600"/>
-            <a:ext cx="5152680" cy="1364040"/>
+            <a:ext cx="5152320" cy="1363680"/>
           </a:xfrm>
           <a:prstGeom prst="rect">
             <a:avLst/>
@@ -18630,7 +18737,7 @@
         <p:spPr>
           <a:xfrm>
             <a:off x="1398600" y="3347640"/>
-            <a:ext cx="4234680" cy="360360"/>
+            <a:ext cx="4234320" cy="360000"/>
           </a:xfrm>
           <a:prstGeom prst="rect">
             <a:avLst/>
@@ -18685,7 +18792,7 @@
         <p:spPr>
           <a:xfrm>
             <a:off x="1398600" y="4606560"/>
-            <a:ext cx="4234680" cy="640080"/>
+            <a:ext cx="4234320" cy="639720"/>
           </a:xfrm>
           <a:prstGeom prst="rect">
             <a:avLst/>
@@ -18740,7 +18847,7 @@
         <p:spPr>
           <a:xfrm>
             <a:off x="1398600" y="5701320"/>
-            <a:ext cx="4234680" cy="900720"/>
+            <a:ext cx="4234320" cy="900360"/>
           </a:xfrm>
           <a:prstGeom prst="rect">
             <a:avLst/>
@@ -18795,9 +18902,9 @@
         <p:grpSpPr>
           <a:xfrm>
             <a:off x="480240" y="3193560"/>
-            <a:ext cx="730440" cy="730440"/>
+            <a:ext cx="730080" cy="730080"/>
             <a:chOff x="480240" y="3193560"/>
-            <a:chExt cx="730440" cy="730440"/>
+            <a:chExt cx="730080" cy="730080"/>
           </a:xfrm>
         </p:grpSpPr>
         <p:sp>
@@ -18809,7 +18916,7 @@
           <p:spPr>
             <a:xfrm>
               <a:off x="480240" y="3193560"/>
-              <a:ext cx="730440" cy="730440"/>
+              <a:ext cx="730080" cy="730080"/>
             </a:xfrm>
             <a:prstGeom prst="ellipse">
               <a:avLst/>
@@ -18837,7 +18944,7 @@
           <p:spPr>
             <a:xfrm>
               <a:off x="633240" y="3360960"/>
-              <a:ext cx="424800" cy="394920"/>
+              <a:ext cx="424440" cy="394560"/>
             </a:xfrm>
             <a:prstGeom prst="rect">
               <a:avLst/>
@@ -18890,9 +18997,9 @@
         <p:grpSpPr>
           <a:xfrm>
             <a:off x="480240" y="4403160"/>
-            <a:ext cx="730440" cy="730440"/>
+            <a:ext cx="730080" cy="730080"/>
             <a:chOff x="480240" y="4403160"/>
-            <a:chExt cx="730440" cy="730440"/>
+            <a:chExt cx="730080" cy="730080"/>
           </a:xfrm>
         </p:grpSpPr>
         <p:sp>
@@ -18904,7 +19011,7 @@
           <p:spPr>
             <a:xfrm>
               <a:off x="480240" y="4403160"/>
-              <a:ext cx="730440" cy="730440"/>
+              <a:ext cx="730080" cy="730080"/>
             </a:xfrm>
             <a:prstGeom prst="ellipse">
               <a:avLst/>
@@ -18932,7 +19039,7 @@
           <p:spPr>
             <a:xfrm>
               <a:off x="633240" y="4570920"/>
-              <a:ext cx="424800" cy="394920"/>
+              <a:ext cx="424440" cy="394560"/>
             </a:xfrm>
             <a:prstGeom prst="rect">
               <a:avLst/>
@@ -18985,9 +19092,9 @@
         <p:grpSpPr>
           <a:xfrm>
             <a:off x="480240" y="5514480"/>
-            <a:ext cx="730440" cy="730440"/>
+            <a:ext cx="730080" cy="730080"/>
             <a:chOff x="480240" y="5514480"/>
-            <a:chExt cx="730440" cy="730440"/>
+            <a:chExt cx="730080" cy="730080"/>
           </a:xfrm>
         </p:grpSpPr>
         <p:sp>
@@ -18999,7 +19106,7 @@
           <p:spPr>
             <a:xfrm>
               <a:off x="480240" y="5514480"/>
-              <a:ext cx="730440" cy="730440"/>
+              <a:ext cx="730080" cy="730080"/>
             </a:xfrm>
             <a:prstGeom prst="ellipse">
               <a:avLst/>
@@ -19027,7 +19134,7 @@
           <p:spPr>
             <a:xfrm>
               <a:off x="633240" y="5682240"/>
-              <a:ext cx="424800" cy="394920"/>
+              <a:ext cx="424440" cy="394560"/>
             </a:xfrm>
             <a:prstGeom prst="rect">
               <a:avLst/>
@@ -19110,7 +19217,7 @@
         <p:spPr>
           <a:xfrm>
             <a:off x="480240" y="1371600"/>
-            <a:ext cx="5614560" cy="4100040"/>
+            <a:ext cx="5614200" cy="4099680"/>
           </a:xfrm>
           <a:prstGeom prst="rect">
             <a:avLst/>
@@ -19168,7 +19275,7 @@
         <p:spPr>
           <a:xfrm>
             <a:off x="480240" y="460800"/>
-            <a:ext cx="5614560" cy="452520"/>
+            <a:ext cx="5614200" cy="452160"/>
           </a:xfrm>
           <a:prstGeom prst="rect">
             <a:avLst/>
@@ -19237,7 +19344,7 @@
         <p:spPr>
           <a:xfrm>
             <a:off x="5940000" y="2133360"/>
-            <a:ext cx="5717520" cy="5066280"/>
+            <a:ext cx="5717160" cy="5065920"/>
           </a:xfrm>
           <a:prstGeom prst="rect">
             <a:avLst/>
@@ -19374,7 +19481,7 @@
         <p:spPr>
           <a:xfrm>
             <a:off x="480240" y="1371600"/>
-            <a:ext cx="5614560" cy="4100040"/>
+            <a:ext cx="5614200" cy="4099680"/>
           </a:xfrm>
           <a:prstGeom prst="rect">
             <a:avLst/>
@@ -19432,7 +19539,7 @@
         <p:spPr>
           <a:xfrm>
             <a:off x="480240" y="460800"/>
-            <a:ext cx="5614560" cy="452520"/>
+            <a:ext cx="5614200" cy="452160"/>
           </a:xfrm>
           <a:prstGeom prst="rect">
             <a:avLst/>
@@ -19501,7 +19608,7 @@
         <p:spPr>
           <a:xfrm>
             <a:off x="5992560" y="1371600"/>
-            <a:ext cx="5717520" cy="5066280"/>
+            <a:ext cx="5717160" cy="5065920"/>
           </a:xfrm>
           <a:prstGeom prst="rect">
             <a:avLst/>
@@ -19734,7 +19841,7 @@
         <p:spPr>
           <a:xfrm>
             <a:off x="6430680" y="1580760"/>
-            <a:ext cx="5152680" cy="1364040"/>
+            <a:ext cx="5152320" cy="1363680"/>
           </a:xfrm>
           <a:prstGeom prst="rect">
             <a:avLst/>
@@ -19792,7 +19899,7 @@
         <p:spPr>
           <a:xfrm>
             <a:off x="480240" y="460800"/>
-            <a:ext cx="5614560" cy="452520"/>
+            <a:ext cx="5614200" cy="452160"/>
           </a:xfrm>
           <a:prstGeom prst="rect">
             <a:avLst/>
@@ -19851,7 +19958,7 @@
         <p:spPr>
           <a:xfrm>
             <a:off x="331920" y="2222640"/>
-            <a:ext cx="6988320" cy="4415040"/>
+            <a:ext cx="6987960" cy="4414680"/>
           </a:xfrm>
           <a:prstGeom prst="rect">
             <a:avLst/>
@@ -19870,7 +19977,7 @@
         <p:spPr>
           <a:xfrm>
             <a:off x="6428520" y="3398760"/>
-            <a:ext cx="4986720" cy="1053360"/>
+            <a:ext cx="4986360" cy="1053000"/>
           </a:xfrm>
           <a:prstGeom prst="rect">
             <a:avLst/>
@@ -19955,7 +20062,7 @@
         <p:spPr>
           <a:xfrm>
             <a:off x="6391080" y="2196360"/>
-            <a:ext cx="5429880" cy="1987560"/>
+            <a:ext cx="5429520" cy="1987200"/>
           </a:xfrm>
           <a:prstGeom prst="rect">
             <a:avLst/>
@@ -20026,7 +20133,7 @@
         <p:spPr>
           <a:xfrm>
             <a:off x="480240" y="460800"/>
-            <a:ext cx="5614560" cy="452520"/>
+            <a:ext cx="5614200" cy="452160"/>
           </a:xfrm>
           <a:prstGeom prst="rect">
             <a:avLst/>
@@ -20081,7 +20188,7 @@
         <p:spPr>
           <a:xfrm>
             <a:off x="6455520" y="4277880"/>
-            <a:ext cx="4986720" cy="1538280"/>
+            <a:ext cx="4986360" cy="1537920"/>
           </a:xfrm>
           <a:prstGeom prst="rect">
             <a:avLst/>
@@ -20154,7 +20261,7 @@
         <p:spPr>
           <a:xfrm>
             <a:off x="419760" y="2749320"/>
-            <a:ext cx="4959000" cy="1892880"/>
+            <a:ext cx="4958640" cy="1892520"/>
           </a:xfrm>
           <a:prstGeom prst="rect">
             <a:avLst/>
@@ -20203,7 +20310,7 @@
         <p:spPr>
           <a:xfrm>
             <a:off x="6450480" y="2908800"/>
-            <a:ext cx="5429880" cy="1987560"/>
+            <a:ext cx="5429520" cy="1987200"/>
           </a:xfrm>
           <a:prstGeom prst="rect">
             <a:avLst/>
@@ -20258,7 +20365,7 @@
         <p:spPr>
           <a:xfrm>
             <a:off x="480240" y="460800"/>
-            <a:ext cx="5614560" cy="452520"/>
+            <a:ext cx="5614200" cy="452160"/>
           </a:xfrm>
           <a:prstGeom prst="rect">
             <a:avLst/>
@@ -20317,7 +20424,7 @@
         <p:spPr>
           <a:xfrm>
             <a:off x="469080" y="1873080"/>
-            <a:ext cx="3761280" cy="1042560"/>
+            <a:ext cx="3760920" cy="1042200"/>
           </a:xfrm>
           <a:prstGeom prst="rect">
             <a:avLst/>
@@ -20340,7 +20447,7 @@
         <p:spPr>
           <a:xfrm>
             <a:off x="469080" y="3221640"/>
-            <a:ext cx="5067720" cy="245160"/>
+            <a:ext cx="5067360" cy="244800"/>
           </a:xfrm>
           <a:prstGeom prst="rect">
             <a:avLst/>
@@ -20363,7 +20470,7 @@
         <p:spPr>
           <a:xfrm>
             <a:off x="469080" y="3702960"/>
-            <a:ext cx="3761280" cy="1420560"/>
+            <a:ext cx="3760920" cy="1420200"/>
           </a:xfrm>
           <a:prstGeom prst="rect">
             <a:avLst/>
@@ -20412,7 +20519,7 @@
         <p:spPr>
           <a:xfrm>
             <a:off x="6450480" y="2908800"/>
-            <a:ext cx="5429880" cy="1987560"/>
+            <a:ext cx="5429520" cy="1987200"/>
           </a:xfrm>
           <a:prstGeom prst="rect">
             <a:avLst/>
@@ -20467,7 +20574,7 @@
         <p:spPr>
           <a:xfrm>
             <a:off x="480240" y="460800"/>
-            <a:ext cx="5614560" cy="452520"/>
+            <a:ext cx="5614200" cy="452160"/>
           </a:xfrm>
           <a:prstGeom prst="rect">
             <a:avLst/>
@@ -20526,7 +20633,7 @@
         <p:spPr>
           <a:xfrm>
             <a:off x="258840" y="3906360"/>
-            <a:ext cx="5424120" cy="1764000"/>
+            <a:ext cx="5423760" cy="1763640"/>
           </a:xfrm>
           <a:prstGeom prst="rect">
             <a:avLst/>

</xml_diff>